<commit_message>
Add jenkins job definitions
</commit_message>
<xml_diff>
--- a/CICD.pptx
+++ b/CICD.pptx
@@ -8,18 +8,19 @@
     <p:sldId id="256" r:id="rId2"/>
     <p:sldId id="258" r:id="rId3"/>
     <p:sldId id="260" r:id="rId4"/>
-    <p:sldId id="263" r:id="rId5"/>
-    <p:sldId id="261" r:id="rId6"/>
-    <p:sldId id="264" r:id="rId7"/>
-    <p:sldId id="265" r:id="rId8"/>
-    <p:sldId id="266" r:id="rId9"/>
-    <p:sldId id="267" r:id="rId10"/>
-    <p:sldId id="268" r:id="rId11"/>
-    <p:sldId id="270" r:id="rId12"/>
-    <p:sldId id="271" r:id="rId13"/>
-    <p:sldId id="272" r:id="rId14"/>
-    <p:sldId id="262" r:id="rId15"/>
-    <p:sldId id="259" r:id="rId16"/>
+    <p:sldId id="273" r:id="rId5"/>
+    <p:sldId id="263" r:id="rId6"/>
+    <p:sldId id="261" r:id="rId7"/>
+    <p:sldId id="264" r:id="rId8"/>
+    <p:sldId id="265" r:id="rId9"/>
+    <p:sldId id="266" r:id="rId10"/>
+    <p:sldId id="267" r:id="rId11"/>
+    <p:sldId id="268" r:id="rId12"/>
+    <p:sldId id="270" r:id="rId13"/>
+    <p:sldId id="271" r:id="rId14"/>
+    <p:sldId id="272" r:id="rId15"/>
+    <p:sldId id="262" r:id="rId16"/>
+    <p:sldId id="259" r:id="rId17"/>
   </p:sldIdLst>
   <p:sldSz cx="12192000" cy="6858000"/>
   <p:notesSz cx="6858000" cy="9144000"/>
@@ -118,6 +119,11 @@
       </a:defRPr>
     </a:lvl9pPr>
   </p:defaultTextStyle>
+  <p:extLst>
+    <p:ext uri="{EFAFB233-063F-42B5-8137-9DF3F51BA10A}">
+      <p15:sldGuideLst xmlns:p15="http://schemas.microsoft.com/office/powerpoint/2012/main"/>
+    </p:ext>
+  </p:extLst>
 </p:presentation>
 </file>
 
@@ -3480,6 +3486,105 @@
       </p:grpSpPr>
       <p:sp>
         <p:nvSpPr>
+          <p:cNvPr id="4" name="Title 1">
+            <a:extLst>
+              <a:ext uri="{FF2B5EF4-FFF2-40B4-BE49-F238E27FC236}">
+                <a16:creationId xmlns:a16="http://schemas.microsoft.com/office/drawing/2014/main" id="{877F74C9-F8CF-40D3-AD7E-90749AEBF846}"/>
+              </a:ext>
+            </a:extLst>
+          </p:cNvPr>
+          <p:cNvSpPr>
+            <a:spLocks noGrp="1"/>
+          </p:cNvSpPr>
+          <p:nvPr>
+            <p:ph type="title"/>
+          </p:nvPr>
+        </p:nvSpPr>
+        <p:spPr>
+          <a:xfrm>
+            <a:off x="838200" y="365125"/>
+            <a:ext cx="10515600" cy="1325563"/>
+          </a:xfrm>
+        </p:spPr>
+        <p:txBody>
+          <a:bodyPr/>
+          <a:lstStyle/>
+          <a:p>
+            <a:r>
+              <a:rPr lang="en-US" dirty="0"/>
+              <a:t>Install Jenkins</a:t>
+            </a:r>
+          </a:p>
+        </p:txBody>
+      </p:sp>
+      <p:pic>
+        <p:nvPicPr>
+          <p:cNvPr id="5" name="Picture 4">
+            <a:extLst>
+              <a:ext uri="{FF2B5EF4-FFF2-40B4-BE49-F238E27FC236}">
+                <a16:creationId xmlns:a16="http://schemas.microsoft.com/office/drawing/2014/main" id="{ACB99308-0071-40DF-B4B6-7233096DC817}"/>
+              </a:ext>
+            </a:extLst>
+          </p:cNvPr>
+          <p:cNvPicPr>
+            <a:picLocks noChangeAspect="1"/>
+          </p:cNvPicPr>
+          <p:nvPr/>
+        </p:nvPicPr>
+        <p:blipFill>
+          <a:blip r:embed="rId2">
+            <a:extLst>
+              <a:ext uri="{28A0092B-C50C-407E-A947-70E740481C1C}">
+                <a14:useLocalDpi xmlns:a14="http://schemas.microsoft.com/office/drawing/2010/main" val="0"/>
+              </a:ext>
+            </a:extLst>
+          </a:blip>
+          <a:stretch>
+            <a:fillRect/>
+          </a:stretch>
+        </p:blipFill>
+        <p:spPr>
+          <a:xfrm>
+            <a:off x="3442917" y="1690688"/>
+            <a:ext cx="5306165" cy="4220164"/>
+          </a:xfrm>
+          <a:prstGeom prst="rect">
+            <a:avLst/>
+          </a:prstGeom>
+        </p:spPr>
+      </p:pic>
+    </p:spTree>
+    <p:extLst>
+      <p:ext uri="{BB962C8B-B14F-4D97-AF65-F5344CB8AC3E}">
+        <p14:creationId xmlns:p14="http://schemas.microsoft.com/office/powerpoint/2010/main" val="1286141962"/>
+      </p:ext>
+    </p:extLst>
+  </p:cSld>
+  <p:clrMapOvr>
+    <a:masterClrMapping/>
+  </p:clrMapOvr>
+</p:sld>
+</file>
+
+<file path=ppt/slides/slide11.xml><?xml version="1.0" encoding="utf-8"?>
+<p:sld xmlns:a="http://schemas.openxmlformats.org/drawingml/2006/main" xmlns:r="http://schemas.openxmlformats.org/officeDocument/2006/relationships" xmlns:p="http://schemas.openxmlformats.org/presentationml/2006/main">
+  <p:cSld>
+    <p:spTree>
+      <p:nvGrpSpPr>
+        <p:cNvPr id="1" name=""/>
+        <p:cNvGrpSpPr/>
+        <p:nvPr/>
+      </p:nvGrpSpPr>
+      <p:grpSpPr>
+        <a:xfrm>
+          <a:off x="0" y="0"/>
+          <a:ext cx="0" cy="0"/>
+          <a:chOff x="0" y="0"/>
+          <a:chExt cx="0" cy="0"/>
+        </a:xfrm>
+      </p:grpSpPr>
+      <p:sp>
+        <p:nvSpPr>
           <p:cNvPr id="2" name="Title 1">
             <a:extLst>
               <a:ext uri="{FF2B5EF4-FFF2-40B4-BE49-F238E27FC236}">
@@ -3560,7 +3665,7 @@
 </p:sld>
 </file>
 
-<file path=ppt/slides/slide11.xml><?xml version="1.0" encoding="utf-8"?>
+<file path=ppt/slides/slide12.xml><?xml version="1.0" encoding="utf-8"?>
 <p:sld xmlns:a="http://schemas.openxmlformats.org/drawingml/2006/main" xmlns:r="http://schemas.openxmlformats.org/officeDocument/2006/relationships" xmlns:p="http://schemas.openxmlformats.org/presentationml/2006/main">
   <p:cSld>
     <p:spTree>
@@ -3659,7 +3764,7 @@
 </p:sld>
 </file>
 
-<file path=ppt/slides/slide12.xml><?xml version="1.0" encoding="utf-8"?>
+<file path=ppt/slides/slide13.xml><?xml version="1.0" encoding="utf-8"?>
 <p:sld xmlns:a="http://schemas.openxmlformats.org/drawingml/2006/main" xmlns:r="http://schemas.openxmlformats.org/officeDocument/2006/relationships" xmlns:p="http://schemas.openxmlformats.org/presentationml/2006/main">
   <p:cSld>
     <p:spTree>
@@ -3758,7 +3863,7 @@
 </p:sld>
 </file>
 
-<file path=ppt/slides/slide13.xml><?xml version="1.0" encoding="utf-8"?>
+<file path=ppt/slides/slide14.xml><?xml version="1.0" encoding="utf-8"?>
 <p:sld xmlns:a="http://schemas.openxmlformats.org/drawingml/2006/main" xmlns:r="http://schemas.openxmlformats.org/officeDocument/2006/relationships" xmlns:p="http://schemas.openxmlformats.org/presentationml/2006/main">
   <p:cSld>
     <p:spTree>
@@ -3862,7 +3967,7 @@
 </p:sld>
 </file>
 
-<file path=ppt/slides/slide14.xml><?xml version="1.0" encoding="utf-8"?>
+<file path=ppt/slides/slide15.xml><?xml version="1.0" encoding="utf-8"?>
 <p:sld xmlns:a="http://schemas.openxmlformats.org/drawingml/2006/main" xmlns:r="http://schemas.openxmlformats.org/officeDocument/2006/relationships" xmlns:p="http://schemas.openxmlformats.org/presentationml/2006/main">
   <p:cSld>
     <p:spTree>
@@ -3950,7 +4055,7 @@
 </p:sld>
 </file>
 
-<file path=ppt/slides/slide15.xml><?xml version="1.0" encoding="utf-8"?>
+<file path=ppt/slides/slide16.xml><?xml version="1.0" encoding="utf-8"?>
 <p:sld xmlns:a="http://schemas.openxmlformats.org/drawingml/2006/main" xmlns:r="http://schemas.openxmlformats.org/officeDocument/2006/relationships" xmlns:p="http://schemas.openxmlformats.org/presentationml/2006/main">
   <p:cSld>
     <p:bg>
@@ -4031,8 +4136,8 @@
         </p:nvSpPr>
         <p:spPr>
           <a:xfrm>
-            <a:off x="3584971" y="3233738"/>
-            <a:ext cx="5022057" cy="557212"/>
+            <a:off x="3662475" y="2286387"/>
+            <a:ext cx="4867050" cy="498003"/>
           </a:xfrm>
         </p:spPr>
         <p:txBody>
@@ -4047,13 +4152,287 @@
                 <a:solidFill>
                   <a:schemeClr val="bg1"/>
                 </a:solidFill>
+                <a:hlinkClick r:id="rId2"/>
               </a:rPr>
               <a:t>https://github.com/wilyoctopus/CICD</a:t>
             </a:r>
+            <a:endParaRPr lang="en-US" sz="2400" dirty="0">
+              <a:solidFill>
+                <a:schemeClr val="bg1"/>
+              </a:solidFill>
+            </a:endParaRPr>
+          </a:p>
+          <a:p>
+            <a:pPr marL="0" indent="0">
+              <a:buNone/>
+            </a:pPr>
+            <a:endParaRPr lang="en-US" sz="2400" dirty="0">
+              <a:solidFill>
+                <a:schemeClr val="bg1"/>
+              </a:solidFill>
+            </a:endParaRPr>
+          </a:p>
+          <a:p>
+            <a:pPr marL="0" indent="0">
+              <a:buNone/>
+            </a:pPr>
             <a:endParaRPr lang="en-US" sz="1600" dirty="0">
               <a:solidFill>
                 <a:schemeClr val="bg1"/>
               </a:solidFill>
+            </a:endParaRPr>
+          </a:p>
+        </p:txBody>
+      </p:sp>
+      <p:sp>
+        <p:nvSpPr>
+          <p:cNvPr id="5" name="Rectangle 1">
+            <a:extLst>
+              <a:ext uri="{FF2B5EF4-FFF2-40B4-BE49-F238E27FC236}">
+                <a16:creationId xmlns:a16="http://schemas.microsoft.com/office/drawing/2014/main" id="{0F90E394-52D5-4A08-8BD5-6DA2E3A9B70E}"/>
+              </a:ext>
+            </a:extLst>
+          </p:cNvPr>
+          <p:cNvSpPr>
+            <a:spLocks noChangeArrowheads="1"/>
+          </p:cNvSpPr>
+          <p:nvPr/>
+        </p:nvSpPr>
+        <p:spPr bwMode="auto">
+          <a:xfrm>
+            <a:off x="675503" y="4226496"/>
+            <a:ext cx="11269361" cy="954107"/>
+          </a:xfrm>
+          <a:prstGeom prst="rect">
+            <a:avLst/>
+          </a:prstGeom>
+          <a:noFill/>
+          <a:ln>
+            <a:noFill/>
+          </a:ln>
+          <a:effectLst/>
+          <a:extLst>
+            <a:ext uri="{909E8E84-426E-40DD-AFC4-6F175D3DCCD1}">
+              <a14:hiddenFill xmlns:a14="http://schemas.microsoft.com/office/drawing/2010/main">
+                <a:solidFill>
+                  <a:schemeClr val="accent1"/>
+                </a:solidFill>
+              </a14:hiddenFill>
+            </a:ext>
+            <a:ext uri="{91240B29-F687-4F45-9708-019B960494DF}">
+              <a14:hiddenLine xmlns:a14="http://schemas.microsoft.com/office/drawing/2010/main" w="9525">
+                <a:solidFill>
+                  <a:schemeClr val="tx1"/>
+                </a:solidFill>
+                <a:miter lim="800000"/>
+                <a:headEnd/>
+                <a:tailEnd/>
+              </a14:hiddenLine>
+            </a:ext>
+            <a:ext uri="{AF507438-7753-43E0-B8FC-AC1667EBCBE1}">
+              <a14:hiddenEffects xmlns:a14="http://schemas.microsoft.com/office/drawing/2010/main">
+                <a:effectLst>
+                  <a:outerShdw dist="35921" dir="2700000" algn="ctr" rotWithShape="0">
+                    <a:schemeClr val="bg2"/>
+                  </a:outerShdw>
+                </a:effectLst>
+              </a14:hiddenEffects>
+            </a:ext>
+          </a:extLst>
+        </p:spPr>
+        <p:txBody>
+          <a:bodyPr vert="horz" wrap="square" lIns="0" tIns="0" rIns="0" bIns="0" numCol="1" anchor="ctr" anchorCtr="0" compatLnSpc="1">
+            <a:prstTxWarp prst="textNoShape">
+              <a:avLst/>
+            </a:prstTxWarp>
+            <a:spAutoFit/>
+          </a:bodyPr>
+          <a:lstStyle/>
+          <a:p>
+            <a:pPr marL="0" marR="0" lvl="0" indent="0" algn="l" defTabSz="914400" rtl="0" eaLnBrk="0" fontAlgn="base" latinLnBrk="0" hangingPunct="0">
+              <a:lnSpc>
+                <a:spcPct val="100000"/>
+              </a:lnSpc>
+              <a:spcBef>
+                <a:spcPct val="0"/>
+              </a:spcBef>
+              <a:spcAft>
+                <a:spcPct val="0"/>
+              </a:spcAft>
+              <a:buClrTx/>
+              <a:buSzTx/>
+              <a:buFontTx/>
+              <a:buNone/>
+              <a:tabLst/>
+            </a:pPr>
+            <a:r>
+              <a:rPr kumimoji="0" lang="en-US" altLang="en-US" sz="1600" b="0" i="0" u="none" strike="noStrike" cap="none" normalizeH="0" baseline="0" dirty="0">
+                <a:ln>
+                  <a:noFill/>
+                </a:ln>
+                <a:solidFill>
+                  <a:schemeClr val="bg1"/>
+                </a:solidFill>
+                <a:effectLst/>
+                <a:latin typeface="Consolas" panose="020B0609020204030204" pitchFamily="49" charset="0"/>
+              </a:rPr>
+              <a:t>Export job: java -jar jenkins-cli.jar -s http://localhost:8080 get-job </a:t>
+            </a:r>
+            <a:r>
+              <a:rPr kumimoji="0" lang="en-US" altLang="en-US" sz="1600" b="0" i="0" u="none" strike="noStrike" cap="none" normalizeH="0" baseline="0" dirty="0" err="1">
+                <a:ln>
+                  <a:noFill/>
+                </a:ln>
+                <a:solidFill>
+                  <a:schemeClr val="bg1"/>
+                </a:solidFill>
+                <a:effectLst/>
+                <a:latin typeface="Consolas" panose="020B0609020204030204" pitchFamily="49" charset="0"/>
+              </a:rPr>
+              <a:t>myjob</a:t>
+            </a:r>
+            <a:r>
+              <a:rPr kumimoji="0" lang="en-US" altLang="en-US" sz="1600" b="0" i="0" u="none" strike="noStrike" cap="none" normalizeH="0" baseline="0" dirty="0">
+                <a:ln>
+                  <a:noFill/>
+                </a:ln>
+                <a:solidFill>
+                  <a:schemeClr val="bg1"/>
+                </a:solidFill>
+                <a:effectLst/>
+                <a:latin typeface="Consolas" panose="020B0609020204030204" pitchFamily="49" charset="0"/>
+              </a:rPr>
+              <a:t> &gt; myjob.xml </a:t>
+            </a:r>
+          </a:p>
+          <a:p>
+            <a:pPr marL="0" marR="0" lvl="0" indent="0" algn="l" defTabSz="914400" rtl="0" eaLnBrk="0" fontAlgn="base" latinLnBrk="0" hangingPunct="0">
+              <a:lnSpc>
+                <a:spcPct val="100000"/>
+              </a:lnSpc>
+              <a:spcBef>
+                <a:spcPct val="0"/>
+              </a:spcBef>
+              <a:spcAft>
+                <a:spcPct val="0"/>
+              </a:spcAft>
+              <a:buClrTx/>
+              <a:buSzTx/>
+              <a:buFontTx/>
+              <a:buNone/>
+              <a:tabLst/>
+            </a:pPr>
+            <a:r>
+              <a:rPr kumimoji="0" lang="en-US" altLang="en-US" sz="1600" b="0" i="0" u="none" strike="noStrike" cap="none" normalizeH="0" baseline="0" dirty="0">
+                <a:ln>
+                  <a:noFill/>
+                </a:ln>
+                <a:solidFill>
+                  <a:schemeClr val="bg1"/>
+                </a:solidFill>
+                <a:effectLst/>
+                <a:latin typeface="Consolas" panose="020B0609020204030204" pitchFamily="49" charset="0"/>
+              </a:rPr>
+              <a:t>Import job: java -jar jenkins-cli.jar -s http://localhost:8080 create-job </a:t>
+            </a:r>
+            <a:r>
+              <a:rPr lang="en-US" altLang="en-US" sz="1600" dirty="0" err="1">
+                <a:solidFill>
+                  <a:schemeClr val="bg1"/>
+                </a:solidFill>
+                <a:latin typeface="Consolas" panose="020B0609020204030204" pitchFamily="49" charset="0"/>
+              </a:rPr>
+              <a:t>mynew</a:t>
+            </a:r>
+            <a:r>
+              <a:rPr kumimoji="0" lang="en-US" altLang="en-US" sz="1600" b="0" i="0" u="none" strike="noStrike" cap="none" normalizeH="0" baseline="0" dirty="0" err="1">
+                <a:ln>
+                  <a:noFill/>
+                </a:ln>
+                <a:solidFill>
+                  <a:schemeClr val="bg1"/>
+                </a:solidFill>
+                <a:effectLst/>
+                <a:latin typeface="Consolas" panose="020B0609020204030204" pitchFamily="49" charset="0"/>
+              </a:rPr>
+              <a:t>job</a:t>
+            </a:r>
+            <a:r>
+              <a:rPr kumimoji="0" lang="en-US" altLang="en-US" sz="1600" b="0" i="0" u="none" strike="noStrike" cap="none" normalizeH="0" baseline="0" dirty="0">
+                <a:ln>
+                  <a:noFill/>
+                </a:ln>
+                <a:solidFill>
+                  <a:schemeClr val="bg1"/>
+                </a:solidFill>
+                <a:effectLst/>
+                <a:latin typeface="Consolas" panose="020B0609020204030204" pitchFamily="49" charset="0"/>
+              </a:rPr>
+              <a:t> &lt; myjob.xml</a:t>
+            </a:r>
+          </a:p>
+          <a:p>
+            <a:pPr marL="0" marR="0" lvl="0" indent="0" algn="l" defTabSz="914400" rtl="0" eaLnBrk="0" fontAlgn="base" latinLnBrk="0" hangingPunct="0">
+              <a:lnSpc>
+                <a:spcPct val="100000"/>
+              </a:lnSpc>
+              <a:spcBef>
+                <a:spcPct val="0"/>
+              </a:spcBef>
+              <a:spcAft>
+                <a:spcPct val="0"/>
+              </a:spcAft>
+              <a:buClrTx/>
+              <a:buSzTx/>
+              <a:buFontTx/>
+              <a:buNone/>
+              <a:tabLst/>
+            </a:pPr>
+            <a:endParaRPr lang="en-US" altLang="en-US" sz="1600" dirty="0">
+              <a:solidFill>
+                <a:schemeClr val="bg1"/>
+              </a:solidFill>
+              <a:latin typeface="Consolas" panose="020B0609020204030204" pitchFamily="49" charset="0"/>
+            </a:endParaRPr>
+          </a:p>
+          <a:p>
+            <a:pPr marL="0" marR="0" lvl="0" indent="0" algn="l" defTabSz="914400" rtl="0" eaLnBrk="0" fontAlgn="base" latinLnBrk="0" hangingPunct="0">
+              <a:lnSpc>
+                <a:spcPct val="100000"/>
+              </a:lnSpc>
+              <a:spcBef>
+                <a:spcPct val="0"/>
+              </a:spcBef>
+              <a:spcAft>
+                <a:spcPct val="0"/>
+              </a:spcAft>
+              <a:buClrTx/>
+              <a:buSzTx/>
+              <a:buFontTx/>
+              <a:buNone/>
+              <a:tabLst/>
+            </a:pPr>
+            <a:r>
+              <a:rPr kumimoji="0" lang="en-US" altLang="en-US" sz="1400" b="0" i="0" u="none" strike="noStrike" cap="none" normalizeH="0" baseline="0" dirty="0">
+                <a:ln>
+                  <a:noFill/>
+                </a:ln>
+                <a:solidFill>
+                  <a:schemeClr val="bg1"/>
+                </a:solidFill>
+                <a:effectLst/>
+              </a:rPr>
+              <a:t> Jenkins CLI jar can be downloaded directly from your Jenkins instance: http://localhost:8080/jnlpJars/jenkins-cli.jar</a:t>
+            </a:r>
+            <a:endParaRPr kumimoji="0" lang="en-US" altLang="en-US" sz="4000" b="0" i="0" u="none" strike="noStrike" cap="none" normalizeH="0" baseline="0" dirty="0">
+              <a:ln>
+                <a:noFill/>
+              </a:ln>
+              <a:solidFill>
+                <a:schemeClr val="bg1"/>
+              </a:solidFill>
+              <a:effectLst/>
+              <a:latin typeface="Arial" panose="020B0604020202020204" pitchFamily="34" charset="0"/>
             </a:endParaRPr>
           </a:p>
         </p:txBody>
@@ -5026,6 +5405,189 @@
 <file path=ppt/slides/slide4.xml><?xml version="1.0" encoding="utf-8"?>
 <p:sld xmlns:a="http://schemas.openxmlformats.org/drawingml/2006/main" xmlns:r="http://schemas.openxmlformats.org/officeDocument/2006/relationships" xmlns:p="http://schemas.openxmlformats.org/presentationml/2006/main">
   <p:cSld>
+    <p:bg>
+      <p:bgPr>
+        <a:solidFill>
+          <a:srgbClr val="171D2A"/>
+        </a:solidFill>
+        <a:effectLst/>
+      </p:bgPr>
+    </p:bg>
+    <p:spTree>
+      <p:nvGrpSpPr>
+        <p:cNvPr id="1" name=""/>
+        <p:cNvGrpSpPr/>
+        <p:nvPr/>
+      </p:nvGrpSpPr>
+      <p:grpSpPr>
+        <a:xfrm>
+          <a:off x="0" y="0"/>
+          <a:ext cx="0" cy="0"/>
+          <a:chOff x="0" y="0"/>
+          <a:chExt cx="0" cy="0"/>
+        </a:xfrm>
+      </p:grpSpPr>
+      <p:sp>
+        <p:nvSpPr>
+          <p:cNvPr id="2" name="Title 1">
+            <a:extLst>
+              <a:ext uri="{FF2B5EF4-FFF2-40B4-BE49-F238E27FC236}">
+                <a16:creationId xmlns:a16="http://schemas.microsoft.com/office/drawing/2014/main" id="{61DA0DE9-37EA-42A6-AA94-CF33EE4FE94B}"/>
+              </a:ext>
+            </a:extLst>
+          </p:cNvPr>
+          <p:cNvSpPr>
+            <a:spLocks noGrp="1"/>
+          </p:cNvSpPr>
+          <p:nvPr>
+            <p:ph type="title"/>
+          </p:nvPr>
+        </p:nvSpPr>
+        <p:spPr>
+          <a:xfrm>
+            <a:off x="838200" y="153192"/>
+            <a:ext cx="10515600" cy="1325563"/>
+          </a:xfrm>
+        </p:spPr>
+        <p:txBody>
+          <a:bodyPr/>
+          <a:lstStyle/>
+          <a:p>
+            <a:pPr algn="ctr"/>
+            <a:r>
+              <a:rPr lang="en-US" dirty="0">
+                <a:solidFill>
+                  <a:schemeClr val="bg1"/>
+                </a:solidFill>
+              </a:rPr>
+              <a:t>Workshop plan</a:t>
+            </a:r>
+          </a:p>
+        </p:txBody>
+      </p:sp>
+      <p:sp>
+        <p:nvSpPr>
+          <p:cNvPr id="3" name="Content Placeholder 2">
+            <a:extLst>
+              <a:ext uri="{FF2B5EF4-FFF2-40B4-BE49-F238E27FC236}">
+                <a16:creationId xmlns:a16="http://schemas.microsoft.com/office/drawing/2014/main" id="{46C8C3FE-5375-4A3A-A476-A5D1297435DA}"/>
+              </a:ext>
+            </a:extLst>
+          </p:cNvPr>
+          <p:cNvSpPr>
+            <a:spLocks noGrp="1"/>
+          </p:cNvSpPr>
+          <p:nvPr>
+            <p:ph idx="1"/>
+          </p:nvPr>
+        </p:nvSpPr>
+        <p:spPr>
+          <a:xfrm>
+            <a:off x="838200" y="2142224"/>
+            <a:ext cx="6392563" cy="3097041"/>
+          </a:xfrm>
+        </p:spPr>
+        <p:txBody>
+          <a:bodyPr>
+            <a:normAutofit/>
+          </a:bodyPr>
+          <a:lstStyle/>
+          <a:p>
+            <a:pPr marL="0" indent="0">
+              <a:buNone/>
+            </a:pPr>
+            <a:r>
+              <a:rPr lang="en-US" sz="2400" dirty="0">
+                <a:solidFill>
+                  <a:schemeClr val="bg1"/>
+                </a:solidFill>
+              </a:rPr>
+              <a:t>1. Prepare your workstation</a:t>
+            </a:r>
+          </a:p>
+          <a:p>
+            <a:pPr marL="0" indent="0">
+              <a:buNone/>
+            </a:pPr>
+            <a:r>
+              <a:rPr lang="en-US" sz="2400" dirty="0">
+                <a:solidFill>
+                  <a:schemeClr val="bg1"/>
+                </a:solidFill>
+              </a:rPr>
+              <a:t>2. Create basic CI job</a:t>
+            </a:r>
+          </a:p>
+          <a:p>
+            <a:pPr marL="0" indent="0">
+              <a:buNone/>
+            </a:pPr>
+            <a:r>
+              <a:rPr lang="en-US" sz="2400" dirty="0">
+                <a:solidFill>
+                  <a:schemeClr val="bg1"/>
+                </a:solidFill>
+              </a:rPr>
+              <a:t>3. Create CI job using “Pipeline”</a:t>
+            </a:r>
+          </a:p>
+          <a:p>
+            <a:pPr marL="0" indent="0">
+              <a:buNone/>
+            </a:pPr>
+            <a:r>
+              <a:rPr lang="en-US" sz="2400" dirty="0">
+                <a:solidFill>
+                  <a:schemeClr val="bg1"/>
+                </a:solidFill>
+              </a:rPr>
+              <a:t>4. Create CD job using IIS as a web server</a:t>
+            </a:r>
+          </a:p>
+          <a:p>
+            <a:pPr marL="0" indent="0">
+              <a:buNone/>
+            </a:pPr>
+            <a:r>
+              <a:rPr lang="en-US" sz="2400" dirty="0">
+                <a:solidFill>
+                  <a:schemeClr val="bg1"/>
+                </a:solidFill>
+              </a:rPr>
+              <a:t>5. Create CD job using Docker</a:t>
+            </a:r>
+          </a:p>
+          <a:p>
+            <a:pPr marL="0" indent="0">
+              <a:buNone/>
+            </a:pPr>
+            <a:r>
+              <a:rPr lang="en-US" sz="2400" dirty="0">
+                <a:solidFill>
+                  <a:schemeClr val="bg1"/>
+                </a:solidFill>
+              </a:rPr>
+              <a:t>6. Overview CD job using Docker, but implemented on the virtual machines in cloud</a:t>
+            </a:r>
+          </a:p>
+        </p:txBody>
+      </p:sp>
+    </p:spTree>
+    <p:extLst>
+      <p:ext uri="{BB962C8B-B14F-4D97-AF65-F5344CB8AC3E}">
+        <p14:creationId xmlns:p14="http://schemas.microsoft.com/office/powerpoint/2010/main" val="3979302180"/>
+      </p:ext>
+    </p:extLst>
+  </p:cSld>
+  <p:clrMapOvr>
+    <a:masterClrMapping/>
+  </p:clrMapOvr>
+</p:sld>
+</file>
+
+<file path=ppt/slides/slide5.xml><?xml version="1.0" encoding="utf-8"?>
+<p:sld xmlns:a="http://schemas.openxmlformats.org/drawingml/2006/main" xmlns:r="http://schemas.openxmlformats.org/officeDocument/2006/relationships" xmlns:p="http://schemas.openxmlformats.org/presentationml/2006/main">
+  <p:cSld>
     <p:spTree>
       <p:nvGrpSpPr>
         <p:cNvPr id="1" name=""/>
@@ -5112,7 +5674,7 @@
         </p:nvSpPr>
         <p:spPr>
           <a:xfrm>
-            <a:off x="7362825" y="2967335"/>
+            <a:off x="7453441" y="2967335"/>
             <a:ext cx="3181350" cy="923330"/>
           </a:xfrm>
           <a:prstGeom prst="rect">
@@ -5252,7 +5814,7 @@
 </p:sld>
 </file>
 
-<file path=ppt/slides/slide5.xml><?xml version="1.0" encoding="utf-8"?>
+<file path=ppt/slides/slide6.xml><?xml version="1.0" encoding="utf-8"?>
 <p:sld xmlns:a="http://schemas.openxmlformats.org/drawingml/2006/main" xmlns:r="http://schemas.openxmlformats.org/officeDocument/2006/relationships" xmlns:p="http://schemas.openxmlformats.org/presentationml/2006/main">
   <p:cSld>
     <p:spTree>
@@ -5346,7 +5908,7 @@
 </p:sld>
 </file>
 
-<file path=ppt/slides/slide6.xml><?xml version="1.0" encoding="utf-8"?>
+<file path=ppt/slides/slide7.xml><?xml version="1.0" encoding="utf-8"?>
 <p:sld xmlns:a="http://schemas.openxmlformats.org/drawingml/2006/main" xmlns:r="http://schemas.openxmlformats.org/officeDocument/2006/relationships" xmlns:p="http://schemas.openxmlformats.org/presentationml/2006/main">
   <p:cSld>
     <p:spTree>
@@ -5440,7 +6002,7 @@
 </p:sld>
 </file>
 
-<file path=ppt/slides/slide7.xml><?xml version="1.0" encoding="utf-8"?>
+<file path=ppt/slides/slide8.xml><?xml version="1.0" encoding="utf-8"?>
 <p:sld xmlns:a="http://schemas.openxmlformats.org/drawingml/2006/main" xmlns:r="http://schemas.openxmlformats.org/officeDocument/2006/relationships" xmlns:p="http://schemas.openxmlformats.org/presentationml/2006/main">
   <p:cSld>
     <p:spTree>
@@ -5539,7 +6101,7 @@
 </p:sld>
 </file>
 
-<file path=ppt/slides/slide8.xml><?xml version="1.0" encoding="utf-8"?>
+<file path=ppt/slides/slide9.xml><?xml version="1.0" encoding="utf-8"?>
 <p:sld xmlns:a="http://schemas.openxmlformats.org/drawingml/2006/main" xmlns:r="http://schemas.openxmlformats.org/officeDocument/2006/relationships" xmlns:p="http://schemas.openxmlformats.org/presentationml/2006/main">
   <p:cSld>
     <p:spTree>
@@ -5629,105 +6191,6 @@
     <p:extLst>
       <p:ext uri="{BB962C8B-B14F-4D97-AF65-F5344CB8AC3E}">
         <p14:creationId xmlns:p14="http://schemas.microsoft.com/office/powerpoint/2010/main" val="183917301"/>
-      </p:ext>
-    </p:extLst>
-  </p:cSld>
-  <p:clrMapOvr>
-    <a:masterClrMapping/>
-  </p:clrMapOvr>
-</p:sld>
-</file>
-
-<file path=ppt/slides/slide9.xml><?xml version="1.0" encoding="utf-8"?>
-<p:sld xmlns:a="http://schemas.openxmlformats.org/drawingml/2006/main" xmlns:r="http://schemas.openxmlformats.org/officeDocument/2006/relationships" xmlns:p="http://schemas.openxmlformats.org/presentationml/2006/main">
-  <p:cSld>
-    <p:spTree>
-      <p:nvGrpSpPr>
-        <p:cNvPr id="1" name=""/>
-        <p:cNvGrpSpPr/>
-        <p:nvPr/>
-      </p:nvGrpSpPr>
-      <p:grpSpPr>
-        <a:xfrm>
-          <a:off x="0" y="0"/>
-          <a:ext cx="0" cy="0"/>
-          <a:chOff x="0" y="0"/>
-          <a:chExt cx="0" cy="0"/>
-        </a:xfrm>
-      </p:grpSpPr>
-      <p:sp>
-        <p:nvSpPr>
-          <p:cNvPr id="4" name="Title 1">
-            <a:extLst>
-              <a:ext uri="{FF2B5EF4-FFF2-40B4-BE49-F238E27FC236}">
-                <a16:creationId xmlns:a16="http://schemas.microsoft.com/office/drawing/2014/main" id="{877F74C9-F8CF-40D3-AD7E-90749AEBF846}"/>
-              </a:ext>
-            </a:extLst>
-          </p:cNvPr>
-          <p:cNvSpPr>
-            <a:spLocks noGrp="1"/>
-          </p:cNvSpPr>
-          <p:nvPr>
-            <p:ph type="title"/>
-          </p:nvPr>
-        </p:nvSpPr>
-        <p:spPr>
-          <a:xfrm>
-            <a:off x="838200" y="365125"/>
-            <a:ext cx="10515600" cy="1325563"/>
-          </a:xfrm>
-        </p:spPr>
-        <p:txBody>
-          <a:bodyPr/>
-          <a:lstStyle/>
-          <a:p>
-            <a:r>
-              <a:rPr lang="en-US" dirty="0"/>
-              <a:t>Install Jenkins</a:t>
-            </a:r>
-          </a:p>
-        </p:txBody>
-      </p:sp>
-      <p:pic>
-        <p:nvPicPr>
-          <p:cNvPr id="5" name="Picture 4">
-            <a:extLst>
-              <a:ext uri="{FF2B5EF4-FFF2-40B4-BE49-F238E27FC236}">
-                <a16:creationId xmlns:a16="http://schemas.microsoft.com/office/drawing/2014/main" id="{ACB99308-0071-40DF-B4B6-7233096DC817}"/>
-              </a:ext>
-            </a:extLst>
-          </p:cNvPr>
-          <p:cNvPicPr>
-            <a:picLocks noChangeAspect="1"/>
-          </p:cNvPicPr>
-          <p:nvPr/>
-        </p:nvPicPr>
-        <p:blipFill>
-          <a:blip r:embed="rId2">
-            <a:extLst>
-              <a:ext uri="{28A0092B-C50C-407E-A947-70E740481C1C}">
-                <a14:useLocalDpi xmlns:a14="http://schemas.microsoft.com/office/drawing/2010/main" val="0"/>
-              </a:ext>
-            </a:extLst>
-          </a:blip>
-          <a:stretch>
-            <a:fillRect/>
-          </a:stretch>
-        </p:blipFill>
-        <p:spPr>
-          <a:xfrm>
-            <a:off x="3442917" y="1690688"/>
-            <a:ext cx="5306165" cy="4220164"/>
-          </a:xfrm>
-          <a:prstGeom prst="rect">
-            <a:avLst/>
-          </a:prstGeom>
-        </p:spPr>
-      </p:pic>
-    </p:spTree>
-    <p:extLst>
-      <p:ext uri="{BB962C8B-B14F-4D97-AF65-F5344CB8AC3E}">
-        <p14:creationId xmlns:p14="http://schemas.microsoft.com/office/powerpoint/2010/main" val="1286141962"/>
       </p:ext>
     </p:extLst>
   </p:cSld>

</xml_diff>